<commit_message>
Recreated README header gif
</commit_message>
<xml_diff>
--- a/www/gifs/Busy_gif.pptx
+++ b/www/gifs/Busy_gif.pptx
@@ -5,9 +5,7 @@
     <p:sldMasterId id="2147483648" r:id="rId1"/>
   </p:sldMasterIdLst>
   <p:sldIdLst>
-    <p:sldId id="256" r:id="rId2"/>
-    <p:sldId id="266" r:id="rId3"/>
-    <p:sldId id="267" r:id="rId4"/>
+    <p:sldId id="271" r:id="rId2"/>
   </p:sldIdLst>
   <p:sldSz cx="12192000" cy="6858000"/>
   <p:notesSz cx="6858000" cy="9144000"/>
@@ -117,7 +115,7 @@
 <file path=ppt/revisionInfo.xml><?xml version="1.0" encoding="utf-8"?>
 <p1510:revInfo xmlns:a="http://schemas.openxmlformats.org/drawingml/2006/main" xmlns:r="http://schemas.openxmlformats.org/officeDocument/2006/relationships" xmlns:p1510="http://schemas.microsoft.com/office/powerpoint/2015/10/main">
   <p1510:revLst>
-    <p1510:client id="{495604E0-DDF9-2644-8AFB-8D07DDAAAD16}" v="19" dt="2022-07-27T12:47:51.083"/>
+    <p1510:client id="{495604E0-DDF9-2644-8AFB-8D07DDAAAD16}" v="72" dt="2022-07-31T15:16:46.746"/>
   </p1510:revLst>
 </p1510:revInfo>
 </file>
@@ -126,27 +124,27 @@
 <pc:chgInfo xmlns:a="http://schemas.openxmlformats.org/drawingml/2006/main" xmlns:r="http://schemas.openxmlformats.org/officeDocument/2006/relationships" xmlns:ac="http://schemas.microsoft.com/office/drawing/2013/main/command" xmlns:pc="http://schemas.microsoft.com/office/powerpoint/2013/main/command">
   <pc:docChgLst>
     <pc:chgData name="Shoaib Ajaib" userId="9e5664ed-2148-4e65-98a2-06b01fdc9d32" providerId="ADAL" clId="{495604E0-DDF9-2644-8AFB-8D07DDAAAD16}"/>
-    <pc:docChg chg="undo custSel modSld">
-      <pc:chgData name="Shoaib Ajaib" userId="9e5664ed-2148-4e65-98a2-06b01fdc9d32" providerId="ADAL" clId="{495604E0-DDF9-2644-8AFB-8D07DDAAAD16}" dt="2022-07-27T12:47:51.083" v="101"/>
+    <pc:docChg chg="undo custSel addSld delSld modSld sldOrd">
+      <pc:chgData name="Shoaib Ajaib" userId="9e5664ed-2148-4e65-98a2-06b01fdc9d32" providerId="ADAL" clId="{495604E0-DDF9-2644-8AFB-8D07DDAAAD16}" dt="2022-07-31T15:18:17.584" v="247" actId="2696"/>
       <pc:docMkLst>
         <pc:docMk/>
       </pc:docMkLst>
-      <pc:sldChg chg="modAnim">
-        <pc:chgData name="Shoaib Ajaib" userId="9e5664ed-2148-4e65-98a2-06b01fdc9d32" providerId="ADAL" clId="{495604E0-DDF9-2644-8AFB-8D07DDAAAD16}" dt="2022-07-27T12:47:37.798" v="98"/>
+      <pc:sldChg chg="del modAnim">
+        <pc:chgData name="Shoaib Ajaib" userId="9e5664ed-2148-4e65-98a2-06b01fdc9d32" providerId="ADAL" clId="{495604E0-DDF9-2644-8AFB-8D07DDAAAD16}" dt="2022-07-31T15:15:10.050" v="211" actId="2696"/>
         <pc:sldMkLst>
           <pc:docMk/>
           <pc:sldMk cId="4050877187" sldId="256"/>
         </pc:sldMkLst>
       </pc:sldChg>
-      <pc:sldChg chg="modAnim">
-        <pc:chgData name="Shoaib Ajaib" userId="9e5664ed-2148-4e65-98a2-06b01fdc9d32" providerId="ADAL" clId="{495604E0-DDF9-2644-8AFB-8D07DDAAAD16}" dt="2022-07-27T12:47:51.083" v="101"/>
+      <pc:sldChg chg="del modAnim">
+        <pc:chgData name="Shoaib Ajaib" userId="9e5664ed-2148-4e65-98a2-06b01fdc9d32" providerId="ADAL" clId="{495604E0-DDF9-2644-8AFB-8D07DDAAAD16}" dt="2022-07-31T15:18:15.337" v="245" actId="2696"/>
         <pc:sldMkLst>
           <pc:docMk/>
           <pc:sldMk cId="1027852967" sldId="266"/>
         </pc:sldMkLst>
       </pc:sldChg>
-      <pc:sldChg chg="addSp delSp modSp mod addAnim delAnim modAnim">
-        <pc:chgData name="Shoaib Ajaib" userId="9e5664ed-2148-4e65-98a2-06b01fdc9d32" providerId="ADAL" clId="{495604E0-DDF9-2644-8AFB-8D07DDAAAD16}" dt="2022-07-27T12:46:28.638" v="97"/>
+      <pc:sldChg chg="addSp delSp modSp del mod addAnim delAnim modAnim">
+        <pc:chgData name="Shoaib Ajaib" userId="9e5664ed-2148-4e65-98a2-06b01fdc9d32" providerId="ADAL" clId="{495604E0-DDF9-2644-8AFB-8D07DDAAAD16}" dt="2022-07-31T15:18:16.275" v="246" actId="2696"/>
         <pc:sldMkLst>
           <pc:docMk/>
           <pc:sldMk cId="2081009468" sldId="267"/>
@@ -184,6 +182,74 @@
           </ac:picMkLst>
         </pc:picChg>
       </pc:sldChg>
+      <pc:sldChg chg="addSp modSp add del mod modAnim">
+        <pc:chgData name="Shoaib Ajaib" userId="9e5664ed-2148-4e65-98a2-06b01fdc9d32" providerId="ADAL" clId="{495604E0-DDF9-2644-8AFB-8D07DDAAAD16}" dt="2022-07-31T15:18:17.584" v="247" actId="2696"/>
+        <pc:sldMkLst>
+          <pc:docMk/>
+          <pc:sldMk cId="4011927488" sldId="268"/>
+        </pc:sldMkLst>
+        <pc:picChg chg="add mod">
+          <ac:chgData name="Shoaib Ajaib" userId="9e5664ed-2148-4e65-98a2-06b01fdc9d32" providerId="ADAL" clId="{495604E0-DDF9-2644-8AFB-8D07DDAAAD16}" dt="2022-07-31T15:08:55.712" v="119" actId="1035"/>
+          <ac:picMkLst>
+            <pc:docMk/>
+            <pc:sldMk cId="4011927488" sldId="268"/>
+            <ac:picMk id="4" creationId="{7CF3289D-5F04-D70C-C805-C88C437B0F17}"/>
+          </ac:picMkLst>
+        </pc:picChg>
+      </pc:sldChg>
+      <pc:sldChg chg="new del ord">
+        <pc:chgData name="Shoaib Ajaib" userId="9e5664ed-2148-4e65-98a2-06b01fdc9d32" providerId="ADAL" clId="{495604E0-DDF9-2644-8AFB-8D07DDAAAD16}" dt="2022-07-31T15:11:26.188" v="144" actId="2696"/>
+        <pc:sldMkLst>
+          <pc:docMk/>
+          <pc:sldMk cId="668144575" sldId="269"/>
+        </pc:sldMkLst>
+      </pc:sldChg>
+      <pc:sldChg chg="addSp modSp add del mod ord modAnim">
+        <pc:chgData name="Shoaib Ajaib" userId="9e5664ed-2148-4e65-98a2-06b01fdc9d32" providerId="ADAL" clId="{495604E0-DDF9-2644-8AFB-8D07DDAAAD16}" dt="2022-07-31T15:18:13.871" v="244" actId="2696"/>
+        <pc:sldMkLst>
+          <pc:docMk/>
+          <pc:sldMk cId="601312352" sldId="270"/>
+        </pc:sldMkLst>
+        <pc:picChg chg="add mod">
+          <ac:chgData name="Shoaib Ajaib" userId="9e5664ed-2148-4e65-98a2-06b01fdc9d32" providerId="ADAL" clId="{495604E0-DDF9-2644-8AFB-8D07DDAAAD16}" dt="2022-07-31T15:12:14.895" v="170" actId="171"/>
+          <ac:picMkLst>
+            <pc:docMk/>
+            <pc:sldMk cId="601312352" sldId="270"/>
+            <ac:picMk id="3" creationId="{AF2EFE7A-C1AE-7CCC-0706-A633EEE3156E}"/>
+          </ac:picMkLst>
+        </pc:picChg>
+        <pc:picChg chg="mod">
+          <ac:chgData name="Shoaib Ajaib" userId="9e5664ed-2148-4e65-98a2-06b01fdc9d32" providerId="ADAL" clId="{495604E0-DDF9-2644-8AFB-8D07DDAAAD16}" dt="2022-07-31T15:12:24.035" v="188" actId="1035"/>
+          <ac:picMkLst>
+            <pc:docMk/>
+            <pc:sldMk cId="601312352" sldId="270"/>
+            <ac:picMk id="5" creationId="{4D046A0A-1A0A-EE4F-9781-0FE62FD47FAB}"/>
+          </ac:picMkLst>
+        </pc:picChg>
+      </pc:sldChg>
+      <pc:sldChg chg="addSp modSp add mod modAnim">
+        <pc:chgData name="Shoaib Ajaib" userId="9e5664ed-2148-4e65-98a2-06b01fdc9d32" providerId="ADAL" clId="{495604E0-DDF9-2644-8AFB-8D07DDAAAD16}" dt="2022-07-31T15:17:51.579" v="243" actId="1076"/>
+        <pc:sldMkLst>
+          <pc:docMk/>
+          <pc:sldMk cId="2341812767" sldId="271"/>
+        </pc:sldMkLst>
+        <pc:picChg chg="add mod">
+          <ac:chgData name="Shoaib Ajaib" userId="9e5664ed-2148-4e65-98a2-06b01fdc9d32" providerId="ADAL" clId="{495604E0-DDF9-2644-8AFB-8D07DDAAAD16}" dt="2022-07-31T15:17:51.579" v="243" actId="1076"/>
+          <ac:picMkLst>
+            <pc:docMk/>
+            <pc:sldMk cId="2341812767" sldId="271"/>
+            <ac:picMk id="2" creationId="{75B3042D-7A7A-B051-C6AF-742F0BA4E7E1}"/>
+          </ac:picMkLst>
+        </pc:picChg>
+        <pc:picChg chg="add mod">
+          <ac:chgData name="Shoaib Ajaib" userId="9e5664ed-2148-4e65-98a2-06b01fdc9d32" providerId="ADAL" clId="{495604E0-DDF9-2644-8AFB-8D07DDAAAD16}" dt="2022-07-31T15:17:14.224" v="239" actId="1035"/>
+          <ac:picMkLst>
+            <pc:docMk/>
+            <pc:sldMk cId="2341812767" sldId="271"/>
+            <ac:picMk id="4" creationId="{4A8298B9-249E-1013-EAEE-3735756DB17F}"/>
+          </ac:picMkLst>
+        </pc:picChg>
+      </pc:sldChg>
     </pc:docChg>
   </pc:docChgLst>
 </pc:chgInfo>
@@ -338,7 +404,7 @@
           <a:p>
             <a:fld id="{BE7F3BFD-4FF6-AF43-9C13-097E00F7D740}" type="datetimeFigureOut">
               <a:rPr lang="en-US" smtClean="0"/>
-              <a:t>7/27/22</a:t>
+              <a:t>7/31/22</a:t>
             </a:fld>
             <a:endParaRPr lang="en-US"/>
           </a:p>
@@ -538,7 +604,7 @@
           <a:p>
             <a:fld id="{BE7F3BFD-4FF6-AF43-9C13-097E00F7D740}" type="datetimeFigureOut">
               <a:rPr lang="en-US" smtClean="0"/>
-              <a:t>7/27/22</a:t>
+              <a:t>7/31/22</a:t>
             </a:fld>
             <a:endParaRPr lang="en-US"/>
           </a:p>
@@ -748,7 +814,7 @@
           <a:p>
             <a:fld id="{BE7F3BFD-4FF6-AF43-9C13-097E00F7D740}" type="datetimeFigureOut">
               <a:rPr lang="en-US" smtClean="0"/>
-              <a:t>7/27/22</a:t>
+              <a:t>7/31/22</a:t>
             </a:fld>
             <a:endParaRPr lang="en-US"/>
           </a:p>
@@ -948,7 +1014,7 @@
           <a:p>
             <a:fld id="{BE7F3BFD-4FF6-AF43-9C13-097E00F7D740}" type="datetimeFigureOut">
               <a:rPr lang="en-US" smtClean="0"/>
-              <a:t>7/27/22</a:t>
+              <a:t>7/31/22</a:t>
             </a:fld>
             <a:endParaRPr lang="en-US"/>
           </a:p>
@@ -1224,7 +1290,7 @@
           <a:p>
             <a:fld id="{BE7F3BFD-4FF6-AF43-9C13-097E00F7D740}" type="datetimeFigureOut">
               <a:rPr lang="en-US" smtClean="0"/>
-              <a:t>7/27/22</a:t>
+              <a:t>7/31/22</a:t>
             </a:fld>
             <a:endParaRPr lang="en-US"/>
           </a:p>
@@ -1492,7 +1558,7 @@
           <a:p>
             <a:fld id="{BE7F3BFD-4FF6-AF43-9C13-097E00F7D740}" type="datetimeFigureOut">
               <a:rPr lang="en-US" smtClean="0"/>
-              <a:t>7/27/22</a:t>
+              <a:t>7/31/22</a:t>
             </a:fld>
             <a:endParaRPr lang="en-US"/>
           </a:p>
@@ -1907,7 +1973,7 @@
           <a:p>
             <a:fld id="{BE7F3BFD-4FF6-AF43-9C13-097E00F7D740}" type="datetimeFigureOut">
               <a:rPr lang="en-US" smtClean="0"/>
-              <a:t>7/27/22</a:t>
+              <a:t>7/31/22</a:t>
             </a:fld>
             <a:endParaRPr lang="en-US"/>
           </a:p>
@@ -2049,7 +2115,7 @@
           <a:p>
             <a:fld id="{BE7F3BFD-4FF6-AF43-9C13-097E00F7D740}" type="datetimeFigureOut">
               <a:rPr lang="en-US" smtClean="0"/>
-              <a:t>7/27/22</a:t>
+              <a:t>7/31/22</a:t>
             </a:fld>
             <a:endParaRPr lang="en-US"/>
           </a:p>
@@ -2162,7 +2228,7 @@
           <a:p>
             <a:fld id="{BE7F3BFD-4FF6-AF43-9C13-097E00F7D740}" type="datetimeFigureOut">
               <a:rPr lang="en-US" smtClean="0"/>
-              <a:t>7/27/22</a:t>
+              <a:t>7/31/22</a:t>
             </a:fld>
             <a:endParaRPr lang="en-US"/>
           </a:p>
@@ -2475,7 +2541,7 @@
           <a:p>
             <a:fld id="{BE7F3BFD-4FF6-AF43-9C13-097E00F7D740}" type="datetimeFigureOut">
               <a:rPr lang="en-US" smtClean="0"/>
-              <a:t>7/27/22</a:t>
+              <a:t>7/31/22</a:t>
             </a:fld>
             <a:endParaRPr lang="en-US"/>
           </a:p>
@@ -2764,7 +2830,7 @@
           <a:p>
             <a:fld id="{BE7F3BFD-4FF6-AF43-9C13-097E00F7D740}" type="datetimeFigureOut">
               <a:rPr lang="en-US" smtClean="0"/>
-              <a:t>7/27/22</a:t>
+              <a:t>7/31/22</a:t>
             </a:fld>
             <a:endParaRPr lang="en-US"/>
           </a:p>
@@ -3007,7 +3073,7 @@
           <a:p>
             <a:fld id="{BE7F3BFD-4FF6-AF43-9C13-097E00F7D740}" type="datetimeFigureOut">
               <a:rPr lang="en-US" smtClean="0"/>
-              <a:t>7/27/22</a:t>
+              <a:t>7/31/22</a:t>
             </a:fld>
             <a:endParaRPr lang="en-US"/>
           </a:p>
@@ -3426,6 +3492,36 @@
       </p:grpSpPr>
       <p:pic>
         <p:nvPicPr>
+          <p:cNvPr id="3" name="Picture 2" descr="A picture containing icon&#10;&#10;Description automatically generated">
+            <a:extLst>
+              <a:ext uri="{FF2B5EF4-FFF2-40B4-BE49-F238E27FC236}">
+                <a16:creationId xmlns:a16="http://schemas.microsoft.com/office/drawing/2014/main" id="{AF2EFE7A-C1AE-7CCC-0706-A633EEE3156E}"/>
+              </a:ext>
+            </a:extLst>
+          </p:cNvPr>
+          <p:cNvPicPr>
+            <a:picLocks noChangeAspect="1"/>
+          </p:cNvPicPr>
+          <p:nvPr/>
+        </p:nvPicPr>
+        <p:blipFill>
+          <a:blip r:embed="rId2"/>
+          <a:stretch>
+            <a:fillRect/>
+          </a:stretch>
+        </p:blipFill>
+        <p:spPr>
+          <a:xfrm>
+            <a:off x="0" y="4966632"/>
+            <a:ext cx="12192000" cy="1517295"/>
+          </a:xfrm>
+          <a:prstGeom prst="rect">
+            <a:avLst/>
+          </a:prstGeom>
+        </p:spPr>
+      </p:pic>
+      <p:pic>
+        <p:nvPicPr>
           <p:cNvPr id="5" name="Picture 4" descr="A picture containing lamp&#10;&#10;Description automatically generated">
             <a:extLst>
               <a:ext uri="{FF2B5EF4-FFF2-40B4-BE49-F238E27FC236}">
@@ -3439,14 +3535,74 @@
           <p:nvPr/>
         </p:nvPicPr>
         <p:blipFill rotWithShape="1">
-          <a:blip r:embed="rId2"/>
+          <a:blip r:embed="rId3"/>
           <a:srcRect t="3668"/>
           <a:stretch/>
         </p:blipFill>
         <p:spPr>
           <a:xfrm>
-            <a:off x="713021" y="2623127"/>
+            <a:off x="713021" y="1469572"/>
             <a:ext cx="5169157" cy="3860800"/>
+          </a:xfrm>
+          <a:prstGeom prst="rect">
+            <a:avLst/>
+          </a:prstGeom>
+        </p:spPr>
+      </p:pic>
+      <p:pic>
+        <p:nvPicPr>
+          <p:cNvPr id="2" name="Picture 1" descr="Icon&#10;&#10;Description automatically generated">
+            <a:extLst>
+              <a:ext uri="{FF2B5EF4-FFF2-40B4-BE49-F238E27FC236}">
+                <a16:creationId xmlns:a16="http://schemas.microsoft.com/office/drawing/2014/main" id="{75B3042D-7A7A-B051-C6AF-742F0BA4E7E1}"/>
+              </a:ext>
+            </a:extLst>
+          </p:cNvPr>
+          <p:cNvPicPr>
+            <a:picLocks noChangeAspect="1"/>
+          </p:cNvPicPr>
+          <p:nvPr/>
+        </p:nvPicPr>
+        <p:blipFill>
+          <a:blip r:embed="rId4"/>
+          <a:stretch>
+            <a:fillRect/>
+          </a:stretch>
+        </p:blipFill>
+        <p:spPr>
+          <a:xfrm rot="611495">
+            <a:off x="3983575" y="583900"/>
+            <a:ext cx="2565400" cy="2171700"/>
+          </a:xfrm>
+          <a:prstGeom prst="rect">
+            <a:avLst/>
+          </a:prstGeom>
+        </p:spPr>
+      </p:pic>
+      <p:pic>
+        <p:nvPicPr>
+          <p:cNvPr id="4" name="Picture 3" descr="Icon&#10;&#10;Description automatically generated">
+            <a:extLst>
+              <a:ext uri="{FF2B5EF4-FFF2-40B4-BE49-F238E27FC236}">
+                <a16:creationId xmlns:a16="http://schemas.microsoft.com/office/drawing/2014/main" id="{4A8298B9-249E-1013-EAEE-3735756DB17F}"/>
+              </a:ext>
+            </a:extLst>
+          </p:cNvPr>
+          <p:cNvPicPr>
+            <a:picLocks noChangeAspect="1"/>
+          </p:cNvPicPr>
+          <p:nvPr/>
+        </p:nvPicPr>
+        <p:blipFill>
+          <a:blip r:embed="rId5"/>
+          <a:stretch>
+            <a:fillRect/>
+          </a:stretch>
+        </p:blipFill>
+        <p:spPr>
+          <a:xfrm>
+            <a:off x="6016487" y="1368163"/>
+            <a:ext cx="3317813" cy="3193200"/>
           </a:xfrm>
           <a:prstGeom prst="rect">
             <a:avLst/>
@@ -3456,18 +3612,18 @@
     </p:spTree>
     <p:extLst>
       <p:ext uri="{BB962C8B-B14F-4D97-AF65-F5344CB8AC3E}">
-        <p14:creationId xmlns:p14="http://schemas.microsoft.com/office/powerpoint/2010/main" val="4050877187"/>
+        <p14:creationId xmlns:p14="http://schemas.microsoft.com/office/powerpoint/2010/main" val="2341812767"/>
       </p:ext>
     </p:extLst>
   </p:cSld>
   <p:clrMapOvr>
     <a:masterClrMapping/>
   </p:clrMapOvr>
-  <mc:AlternateContent xmlns:mc="http://schemas.openxmlformats.org/markup-compatibility/2006" xmlns:p14="http://schemas.microsoft.com/office/powerpoint/2010/main">
-    <mc:Choice Requires="p14">
+  <mc:AlternateContent xmlns:mc="http://schemas.openxmlformats.org/markup-compatibility/2006">
+    <mc:Choice xmlns:p14="http://schemas.microsoft.com/office/powerpoint/2010/main" Requires="p14">
       <p:transition p14:dur="0" advTm="1000"/>
     </mc:Choice>
-    <mc:Fallback xmlns="">
+    <mc:Fallback>
       <p:transition advTm="1000"/>
     </mc:Fallback>
   </mc:AlternateContent>
@@ -3495,7 +3651,7 @@
                             </p:stCondLst>
                             <p:childTnLst>
                               <p:par>
-                                <p:cTn id="5" presetID="22" presetClass="entr" presetSubtype="4" repeatCount="0" fill="hold" nodeType="withEffect">
+                                <p:cTn id="5" presetID="55" presetClass="entr" presetSubtype="0" fill="hold" nodeType="withEffect">
                                   <p:stCondLst>
                                     <p:cond delay="0"/>
                                   </p:stCondLst>
@@ -3503,6 +3659,96 @@
                                     <p:set>
                                       <p:cBhvr>
                                         <p:cTn id="6" dur="1" fill="hold">
+                                          <p:stCondLst>
+                                            <p:cond delay="0"/>
+                                          </p:stCondLst>
+                                        </p:cTn>
+                                        <p:tgtEl>
+                                          <p:spTgt spid="3"/>
+                                        </p:tgtEl>
+                                        <p:attrNameLst>
+                                          <p:attrName>style.visibility</p:attrName>
+                                        </p:attrNameLst>
+                                      </p:cBhvr>
+                                      <p:to>
+                                        <p:strVal val="visible"/>
+                                      </p:to>
+                                    </p:set>
+                                    <p:anim calcmode="lin" valueType="num">
+                                      <p:cBhvr>
+                                        <p:cTn id="7" dur="2000" fill="hold"/>
+                                        <p:tgtEl>
+                                          <p:spTgt spid="3"/>
+                                        </p:tgtEl>
+                                        <p:attrNameLst>
+                                          <p:attrName>ppt_w</p:attrName>
+                                        </p:attrNameLst>
+                                      </p:cBhvr>
+                                      <p:tavLst>
+                                        <p:tav tm="0">
+                                          <p:val>
+                                            <p:strVal val="#ppt_w*0.70"/>
+                                          </p:val>
+                                        </p:tav>
+                                        <p:tav tm="100000">
+                                          <p:val>
+                                            <p:strVal val="#ppt_w"/>
+                                          </p:val>
+                                        </p:tav>
+                                      </p:tavLst>
+                                    </p:anim>
+                                    <p:anim calcmode="lin" valueType="num">
+                                      <p:cBhvr>
+                                        <p:cTn id="8" dur="2000" fill="hold"/>
+                                        <p:tgtEl>
+                                          <p:spTgt spid="3"/>
+                                        </p:tgtEl>
+                                        <p:attrNameLst>
+                                          <p:attrName>ppt_h</p:attrName>
+                                        </p:attrNameLst>
+                                      </p:cBhvr>
+                                      <p:tavLst>
+                                        <p:tav tm="0">
+                                          <p:val>
+                                            <p:strVal val="#ppt_h"/>
+                                          </p:val>
+                                        </p:tav>
+                                        <p:tav tm="100000">
+                                          <p:val>
+                                            <p:strVal val="#ppt_h"/>
+                                          </p:val>
+                                        </p:tav>
+                                      </p:tavLst>
+                                    </p:anim>
+                                    <p:animEffect transition="in" filter="fade">
+                                      <p:cBhvr>
+                                        <p:cTn id="9" dur="2000"/>
+                                        <p:tgtEl>
+                                          <p:spTgt spid="3"/>
+                                        </p:tgtEl>
+                                      </p:cBhvr>
+                                    </p:animEffect>
+                                  </p:childTnLst>
+                                </p:cTn>
+                              </p:par>
+                            </p:childTnLst>
+                          </p:cTn>
+                        </p:par>
+                        <p:par>
+                          <p:cTn id="10" fill="hold">
+                            <p:stCondLst>
+                              <p:cond delay="2000"/>
+                            </p:stCondLst>
+                            <p:childTnLst>
+                              <p:par>
+                                <p:cTn id="11" presetID="22" presetClass="entr" presetSubtype="4" repeatCount="0" fill="hold" nodeType="afterEffect">
+                                  <p:stCondLst>
+                                    <p:cond delay="0"/>
+                                  </p:stCondLst>
+                                  <p:childTnLst>
+                                    <p:set>
+                                      <p:cBhvr>
+                                        <p:cTn id="12" dur="1" fill="hold">
                                           <p:stCondLst>
                                             <p:cond delay="0"/>
                                           </p:stCondLst>
@@ -3520,7 +3766,7 @@
                                     </p:set>
                                     <p:animEffect transition="in" filter="wipe(down)">
                                       <p:cBhvr>
-                                        <p:cTn id="7" dur="500"/>
+                                        <p:cTn id="13" dur="500"/>
                                         <p:tgtEl>
                                           <p:spTgt spid="5"/>
                                         </p:tgtEl>
@@ -3532,160 +3778,21 @@
                             </p:childTnLst>
                           </p:cTn>
                         </p:par>
-                      </p:childTnLst>
-                    </p:cTn>
-                  </p:par>
-                </p:childTnLst>
-              </p:cTn>
-              <p:prevCondLst>
-                <p:cond evt="onPrev" delay="0">
-                  <p:tgtEl>
-                    <p:sldTgt/>
-                  </p:tgtEl>
-                </p:cond>
-              </p:prevCondLst>
-              <p:nextCondLst>
-                <p:cond evt="onNext" delay="0">
-                  <p:tgtEl>
-                    <p:sldTgt/>
-                  </p:tgtEl>
-                </p:cond>
-              </p:nextCondLst>
-            </p:seq>
-          </p:childTnLst>
-        </p:cTn>
-      </p:par>
-    </p:tnLst>
-  </p:timing>
-</p:sld>
-</file>
-
-<file path=ppt/slides/slide2.xml><?xml version="1.0" encoding="utf-8"?>
-<p:sld xmlns:a="http://schemas.openxmlformats.org/drawingml/2006/main" xmlns:r="http://schemas.openxmlformats.org/officeDocument/2006/relationships" xmlns:p="http://schemas.openxmlformats.org/presentationml/2006/main">
-  <p:cSld>
-    <p:spTree>
-      <p:nvGrpSpPr>
-        <p:cNvPr id="1" name=""/>
-        <p:cNvGrpSpPr/>
-        <p:nvPr/>
-      </p:nvGrpSpPr>
-      <p:grpSpPr>
-        <a:xfrm>
-          <a:off x="0" y="0"/>
-          <a:ext cx="0" cy="0"/>
-          <a:chOff x="0" y="0"/>
-          <a:chExt cx="0" cy="0"/>
-        </a:xfrm>
-      </p:grpSpPr>
-      <p:pic>
-        <p:nvPicPr>
-          <p:cNvPr id="5" name="Picture 4" descr="A picture containing lamp&#10;&#10;Description automatically generated">
-            <a:extLst>
-              <a:ext uri="{FF2B5EF4-FFF2-40B4-BE49-F238E27FC236}">
-                <a16:creationId xmlns:a16="http://schemas.microsoft.com/office/drawing/2014/main" id="{4D046A0A-1A0A-EE4F-9781-0FE62FD47FAB}"/>
-              </a:ext>
-            </a:extLst>
-          </p:cNvPr>
-          <p:cNvPicPr>
-            <a:picLocks noChangeAspect="1"/>
-          </p:cNvPicPr>
-          <p:nvPr/>
-        </p:nvPicPr>
-        <p:blipFill rotWithShape="1">
-          <a:blip r:embed="rId2"/>
-          <a:srcRect t="3668"/>
-          <a:stretch/>
-        </p:blipFill>
-        <p:spPr>
-          <a:xfrm>
-            <a:off x="713021" y="2623127"/>
-            <a:ext cx="5169157" cy="3860800"/>
-          </a:xfrm>
-          <a:prstGeom prst="rect">
-            <a:avLst/>
-          </a:prstGeom>
-        </p:spPr>
-      </p:pic>
-      <p:pic>
-        <p:nvPicPr>
-          <p:cNvPr id="2" name="Picture 1" descr="Icon&#10;&#10;Description automatically generated">
-            <a:extLst>
-              <a:ext uri="{FF2B5EF4-FFF2-40B4-BE49-F238E27FC236}">
-                <a16:creationId xmlns:a16="http://schemas.microsoft.com/office/drawing/2014/main" id="{5F638D1C-C3F5-8AC4-59F2-ADDE447BF181}"/>
-              </a:ext>
-            </a:extLst>
-          </p:cNvPr>
-          <p:cNvPicPr>
-            <a:picLocks noChangeAspect="1"/>
-          </p:cNvPicPr>
-          <p:nvPr/>
-        </p:nvPicPr>
-        <p:blipFill>
-          <a:blip r:embed="rId3"/>
-          <a:stretch>
-            <a:fillRect/>
-          </a:stretch>
-        </p:blipFill>
-        <p:spPr>
-          <a:xfrm>
-            <a:off x="3827006" y="1396568"/>
-            <a:ext cx="2565400" cy="2171700"/>
-          </a:xfrm>
-          <a:prstGeom prst="rect">
-            <a:avLst/>
-          </a:prstGeom>
-        </p:spPr>
-      </p:pic>
-    </p:spTree>
-    <p:extLst>
-      <p:ext uri="{BB962C8B-B14F-4D97-AF65-F5344CB8AC3E}">
-        <p14:creationId xmlns:p14="http://schemas.microsoft.com/office/powerpoint/2010/main" val="1027852967"/>
-      </p:ext>
-    </p:extLst>
-  </p:cSld>
-  <p:clrMapOvr>
-    <a:masterClrMapping/>
-  </p:clrMapOvr>
-  <mc:AlternateContent xmlns:mc="http://schemas.openxmlformats.org/markup-compatibility/2006" xmlns:p14="http://schemas.microsoft.com/office/powerpoint/2010/main">
-    <mc:Choice Requires="p14">
-      <p:transition p14:dur="0" advTm="1000"/>
-    </mc:Choice>
-    <mc:Fallback xmlns="">
-      <p:transition advTm="1000"/>
-    </mc:Fallback>
-  </mc:AlternateContent>
-  <p:timing>
-    <p:tnLst>
-      <p:par>
-        <p:cTn id="1" dur="indefinite" restart="never" nodeType="tmRoot">
-          <p:childTnLst>
-            <p:seq concurrent="1" nextAc="seek">
-              <p:cTn id="2" dur="indefinite" nodeType="mainSeq">
-                <p:childTnLst>
-                  <p:par>
-                    <p:cTn id="3" fill="hold">
-                      <p:stCondLst>
-                        <p:cond delay="indefinite"/>
-                        <p:cond evt="onBegin" delay="0">
-                          <p:tn val="2"/>
-                        </p:cond>
-                      </p:stCondLst>
-                      <p:childTnLst>
                         <p:par>
-                          <p:cTn id="4" fill="hold">
+                          <p:cTn id="14" fill="hold">
                             <p:stCondLst>
-                              <p:cond delay="0"/>
+                              <p:cond delay="2500"/>
                             </p:stCondLst>
                             <p:childTnLst>
                               <p:par>
-                                <p:cTn id="5" presetID="18" presetClass="entr" presetSubtype="3" fill="hold" nodeType="withEffect">
+                                <p:cTn id="15" presetID="18" presetClass="entr" presetSubtype="3" fill="hold" nodeType="afterEffect">
                                   <p:stCondLst>
                                     <p:cond delay="0"/>
                                   </p:stCondLst>
                                   <p:childTnLst>
                                     <p:set>
                                       <p:cBhvr>
-                                        <p:cTn id="6" dur="1" fill="hold">
+                                        <p:cTn id="16" dur="1" fill="hold">
                                           <p:stCondLst>
                                             <p:cond delay="0"/>
                                           </p:stCondLst>
@@ -3703,7 +3810,7 @@
                                     </p:set>
                                     <p:animEffect transition="in" filter="strips(upRight)">
                                       <p:cBhvr>
-                                        <p:cTn id="7" dur="500"/>
+                                        <p:cTn id="17" dur="500"/>
                                         <p:tgtEl>
                                           <p:spTgt spid="2"/>
                                         </p:tgtEl>
@@ -3712,199 +3819,21 @@
                                   </p:childTnLst>
                                 </p:cTn>
                               </p:par>
-                            </p:childTnLst>
-                          </p:cTn>
-                        </p:par>
-                      </p:childTnLst>
-                    </p:cTn>
-                  </p:par>
-                </p:childTnLst>
-              </p:cTn>
-              <p:prevCondLst>
-                <p:cond evt="onPrev" delay="0">
-                  <p:tgtEl>
-                    <p:sldTgt/>
-                  </p:tgtEl>
-                </p:cond>
-              </p:prevCondLst>
-              <p:nextCondLst>
-                <p:cond evt="onNext" delay="0">
-                  <p:tgtEl>
-                    <p:sldTgt/>
-                  </p:tgtEl>
-                </p:cond>
-              </p:nextCondLst>
-            </p:seq>
-          </p:childTnLst>
-        </p:cTn>
-      </p:par>
-    </p:tnLst>
-  </p:timing>
-</p:sld>
-</file>
-
-<file path=ppt/slides/slide3.xml><?xml version="1.0" encoding="utf-8"?>
-<p:sld xmlns:a="http://schemas.openxmlformats.org/drawingml/2006/main" xmlns:r="http://schemas.openxmlformats.org/officeDocument/2006/relationships" xmlns:p="http://schemas.openxmlformats.org/presentationml/2006/main">
-  <p:cSld>
-    <p:spTree>
-      <p:nvGrpSpPr>
-        <p:cNvPr id="1" name=""/>
-        <p:cNvGrpSpPr/>
-        <p:nvPr/>
-      </p:nvGrpSpPr>
-      <p:grpSpPr>
-        <a:xfrm>
-          <a:off x="0" y="0"/>
-          <a:ext cx="0" cy="0"/>
-          <a:chOff x="0" y="0"/>
-          <a:chExt cx="0" cy="0"/>
-        </a:xfrm>
-      </p:grpSpPr>
-      <p:pic>
-        <p:nvPicPr>
-          <p:cNvPr id="5" name="Picture 4" descr="A picture containing lamp&#10;&#10;Description automatically generated">
-            <a:extLst>
-              <a:ext uri="{FF2B5EF4-FFF2-40B4-BE49-F238E27FC236}">
-                <a16:creationId xmlns:a16="http://schemas.microsoft.com/office/drawing/2014/main" id="{4D046A0A-1A0A-EE4F-9781-0FE62FD47FAB}"/>
-              </a:ext>
-            </a:extLst>
-          </p:cNvPr>
-          <p:cNvPicPr>
-            <a:picLocks noChangeAspect="1"/>
-          </p:cNvPicPr>
-          <p:nvPr/>
-        </p:nvPicPr>
-        <p:blipFill rotWithShape="1">
-          <a:blip r:embed="rId2"/>
-          <a:srcRect t="3668"/>
-          <a:stretch/>
-        </p:blipFill>
-        <p:spPr>
-          <a:xfrm>
-            <a:off x="713021" y="2623127"/>
-            <a:ext cx="5169157" cy="3860800"/>
-          </a:xfrm>
-          <a:prstGeom prst="rect">
-            <a:avLst/>
-          </a:prstGeom>
-        </p:spPr>
-      </p:pic>
-      <p:pic>
-        <p:nvPicPr>
-          <p:cNvPr id="2" name="Picture 1" descr="Icon&#10;&#10;Description automatically generated">
-            <a:extLst>
-              <a:ext uri="{FF2B5EF4-FFF2-40B4-BE49-F238E27FC236}">
-                <a16:creationId xmlns:a16="http://schemas.microsoft.com/office/drawing/2014/main" id="{5F638D1C-C3F5-8AC4-59F2-ADDE447BF181}"/>
-              </a:ext>
-            </a:extLst>
-          </p:cNvPr>
-          <p:cNvPicPr>
-            <a:picLocks noChangeAspect="1"/>
-          </p:cNvPicPr>
-          <p:nvPr/>
-        </p:nvPicPr>
-        <p:blipFill>
-          <a:blip r:embed="rId3"/>
-          <a:stretch>
-            <a:fillRect/>
-          </a:stretch>
-        </p:blipFill>
-        <p:spPr>
-          <a:xfrm>
-            <a:off x="3827006" y="1396568"/>
-            <a:ext cx="2565400" cy="2171700"/>
-          </a:xfrm>
-          <a:prstGeom prst="rect">
-            <a:avLst/>
-          </a:prstGeom>
-        </p:spPr>
-      </p:pic>
-      <p:pic>
-        <p:nvPicPr>
-          <p:cNvPr id="10" name="Picture 9" descr="Icon&#10;&#10;Description automatically generated">
-            <a:extLst>
-              <a:ext uri="{FF2B5EF4-FFF2-40B4-BE49-F238E27FC236}">
-                <a16:creationId xmlns:a16="http://schemas.microsoft.com/office/drawing/2014/main" id="{3D8E873D-E33A-85C4-A424-AA07BFA57917}"/>
-              </a:ext>
-            </a:extLst>
-          </p:cNvPr>
-          <p:cNvPicPr>
-            <a:picLocks noChangeAspect="1"/>
-          </p:cNvPicPr>
-          <p:nvPr/>
-        </p:nvPicPr>
-        <p:blipFill>
-          <a:blip r:embed="rId4"/>
-          <a:stretch>
-            <a:fillRect/>
-          </a:stretch>
-        </p:blipFill>
-        <p:spPr>
-          <a:xfrm>
-            <a:off x="6016487" y="1832400"/>
-            <a:ext cx="3317813" cy="3193200"/>
-          </a:xfrm>
-          <a:prstGeom prst="rect">
-            <a:avLst/>
-          </a:prstGeom>
-        </p:spPr>
-      </p:pic>
-    </p:spTree>
-    <p:extLst>
-      <p:ext uri="{BB962C8B-B14F-4D97-AF65-F5344CB8AC3E}">
-        <p14:creationId xmlns:p14="http://schemas.microsoft.com/office/powerpoint/2010/main" val="2081009468"/>
-      </p:ext>
-    </p:extLst>
-  </p:cSld>
-  <p:clrMapOvr>
-    <a:masterClrMapping/>
-  </p:clrMapOvr>
-  <mc:AlternateContent xmlns:mc="http://schemas.openxmlformats.org/markup-compatibility/2006" xmlns:p14="http://schemas.microsoft.com/office/powerpoint/2010/main">
-    <mc:Choice Requires="p14">
-      <p:transition spd="slow" p14:dur="2000" advTm="1000"/>
-    </mc:Choice>
-    <mc:Fallback xmlns="">
-      <p:transition spd="slow" advTm="1000"/>
-    </mc:Fallback>
-  </mc:AlternateContent>
-  <p:timing>
-    <p:tnLst>
-      <p:par>
-        <p:cTn id="1" dur="indefinite" restart="never" nodeType="tmRoot">
-          <p:childTnLst>
-            <p:seq concurrent="1" nextAc="seek">
-              <p:cTn id="2" dur="indefinite" nodeType="mainSeq">
-                <p:childTnLst>
-                  <p:par>
-                    <p:cTn id="3" fill="hold">
-                      <p:stCondLst>
-                        <p:cond delay="indefinite"/>
-                        <p:cond evt="onBegin" delay="0">
-                          <p:tn val="2"/>
-                        </p:cond>
-                      </p:stCondLst>
-                      <p:childTnLst>
-                        <p:par>
-                          <p:cTn id="4" fill="hold">
-                            <p:stCondLst>
-                              <p:cond delay="0"/>
-                            </p:stCondLst>
-                            <p:childTnLst>
                               <p:par>
-                                <p:cTn id="5" presetID="6" presetClass="entr" presetSubtype="32" fill="hold" nodeType="withEffect">
+                                <p:cTn id="18" presetID="6" presetClass="entr" presetSubtype="32" fill="hold" nodeType="withEffect">
                                   <p:stCondLst>
                                     <p:cond delay="0"/>
                                   </p:stCondLst>
                                   <p:childTnLst>
                                     <p:set>
                                       <p:cBhvr>
-                                        <p:cTn id="6" dur="1" fill="hold">
+                                        <p:cTn id="19" dur="1" fill="hold">
                                           <p:stCondLst>
                                             <p:cond delay="0"/>
                                           </p:stCondLst>
                                         </p:cTn>
                                         <p:tgtEl>
-                                          <p:spTgt spid="10"/>
+                                          <p:spTgt spid="4"/>
                                         </p:tgtEl>
                                         <p:attrNameLst>
                                           <p:attrName>style.visibility</p:attrName>
@@ -3916,9 +3845,9 @@
                                     </p:set>
                                     <p:animEffect transition="in" filter="circle(out)">
                                       <p:cBhvr>
-                                        <p:cTn id="7" dur="1000"/>
+                                        <p:cTn id="20" dur="1000"/>
                                         <p:tgtEl>
-                                          <p:spTgt spid="10"/>
+                                          <p:spTgt spid="4"/>
                                         </p:tgtEl>
                                       </p:cBhvr>
                                     </p:animEffect>
@@ -3926,16 +3855,16 @@
                                 </p:cTn>
                               </p:par>
                               <p:par>
-                                <p:cTn id="8" presetID="6" presetClass="emph" presetSubtype="0" fill="hold" nodeType="withEffect">
+                                <p:cTn id="21" presetID="6" presetClass="emph" presetSubtype="0" fill="hold" nodeType="withEffect">
                                   <p:stCondLst>
                                     <p:cond delay="0"/>
                                   </p:stCondLst>
                                   <p:childTnLst>
                                     <p:animScale>
                                       <p:cBhvr>
-                                        <p:cTn id="9" dur="1000" fill="hold"/>
+                                        <p:cTn id="22" dur="1000" fill="hold"/>
                                         <p:tgtEl>
-                                          <p:spTgt spid="10"/>
+                                          <p:spTgt spid="4"/>
                                         </p:tgtEl>
                                       </p:cBhvr>
                                       <p:by x="150000" y="150000"/>

</xml_diff>